<commit_message>
Updated presentation, and done some statistical analysis on publishers
</commit_message>
<xml_diff>
--- a/documentation/video_games_presentation.pptx
+++ b/documentation/video_games_presentation.pptx
@@ -10,6 +10,13 @@
     <p:sldId id="258" r:id="rId4"/>
     <p:sldId id="259" r:id="rId5"/>
     <p:sldId id="260" r:id="rId6"/>
+    <p:sldId id="261" r:id="rId7"/>
+    <p:sldId id="262" r:id="rId8"/>
+    <p:sldId id="263" r:id="rId9"/>
+    <p:sldId id="264" r:id="rId10"/>
+    <p:sldId id="265" r:id="rId11"/>
+    <p:sldId id="266" r:id="rId12"/>
+    <p:sldId id="267" r:id="rId13"/>
   </p:sldIdLst>
   <p:sldSz cx="9144000" cy="6858000" type="screen4x3"/>
   <p:notesSz cx="6858000" cy="9144000"/>
@@ -3231,6 +3238,262 @@
 </p:sld>
 </file>
 
+<file path=ppt/slides/slide10.xml><?xml version="1.0" encoding="utf-8"?>
+<p:sld xmlns:a="http://schemas.openxmlformats.org/drawingml/2006/main" xmlns:r="http://schemas.openxmlformats.org/officeDocument/2006/relationships" xmlns:p="http://schemas.openxmlformats.org/presentationml/2006/main">
+  <p:cSld>
+    <p:spTree>
+      <p:nvGrpSpPr>
+        <p:cNvPr id="1" name=""/>
+        <p:cNvGrpSpPr/>
+        <p:nvPr/>
+      </p:nvGrpSpPr>
+      <p:grpSpPr>
+        <a:xfrm>
+          <a:off x="0" y="0"/>
+          <a:ext cx="0" cy="0"/>
+          <a:chOff x="0" y="0"/>
+          <a:chExt cx="0" cy="0"/>
+        </a:xfrm>
+      </p:grpSpPr>
+      <p:sp>
+        <p:nvSpPr>
+          <p:cNvPr id="2" name="Title 1"/>
+          <p:cNvSpPr>
+            <a:spLocks noGrp="1"/>
+          </p:cNvSpPr>
+          <p:nvPr>
+            <p:ph type="title"/>
+          </p:nvPr>
+        </p:nvSpPr>
+        <p:spPr/>
+        <p:txBody>
+          <a:bodyPr/>
+          <a:lstStyle/>
+          <a:p>
+            <a:pPr lvl="0" marL="0" indent="0">
+              <a:buNone/>
+            </a:pPr>
+            <a:r>
+              <a:rPr/>
+              <a:t>When</a:t>
+            </a:r>
+            <a:r>
+              <a:rPr/>
+              <a:t> </a:t>
+            </a:r>
+            <a:r>
+              <a:rPr/>
+              <a:t>This</a:t>
+            </a:r>
+            <a:r>
+              <a:rPr/>
+              <a:t> </a:t>
+            </a:r>
+            <a:r>
+              <a:rPr/>
+              <a:t>is</a:t>
+            </a:r>
+            <a:r>
+              <a:rPr/>
+              <a:t> </a:t>
+            </a:r>
+            <a:r>
+              <a:rPr/>
+              <a:t>Put</a:t>
+            </a:r>
+            <a:r>
+              <a:rPr/>
+              <a:t> </a:t>
+            </a:r>
+            <a:r>
+              <a:rPr/>
+              <a:t>Together</a:t>
+            </a:r>
+          </a:p>
+        </p:txBody>
+      </p:sp>
+      <p:pic>
+        <p:nvPicPr>
+          <p:cNvPr descr="video_games_presentation_files/figure-pptx/unnamed-chunk-9-1.png" id="0" name="Picture 1"/>
+          <p:cNvPicPr>
+            <a:picLocks noGrp="1" noChangeAspect="1"/>
+          </p:cNvPicPr>
+          <p:nvPr/>
+        </p:nvPicPr>
+        <p:blipFill>
+          <a:blip r:embed="rId2"/>
+          <a:stretch>
+            <a:fillRect/>
+          </a:stretch>
+        </p:blipFill>
+        <p:spPr bwMode="auto">
+          <a:xfrm>
+            <a:off x="1752600" y="1600200"/>
+            <a:ext cx="5651500" cy="4521200"/>
+          </a:xfrm>
+          <a:prstGeom prst="rect">
+            <a:avLst/>
+          </a:prstGeom>
+          <a:noFill/>
+          <a:ln w="9525">
+            <a:noFill/>
+            <a:headEnd/>
+            <a:tailEnd/>
+          </a:ln>
+        </p:spPr>
+      </p:pic>
+    </p:spTree>
+  </p:cSld>
+</p:sld>
+</file>
+
+<file path=ppt/slides/slide11.xml><?xml version="1.0" encoding="utf-8"?>
+<p:sld xmlns:a="http://schemas.openxmlformats.org/drawingml/2006/main" xmlns:r="http://schemas.openxmlformats.org/officeDocument/2006/relationships" xmlns:p="http://schemas.openxmlformats.org/presentationml/2006/main">
+  <p:cSld>
+    <p:spTree>
+      <p:nvGrpSpPr>
+        <p:cNvPr id="1" name=""/>
+        <p:cNvGrpSpPr/>
+        <p:nvPr/>
+      </p:nvGrpSpPr>
+      <p:grpSpPr>
+        <a:xfrm>
+          <a:off x="0" y="0"/>
+          <a:ext cx="0" cy="0"/>
+          <a:chOff x="0" y="0"/>
+          <a:chExt cx="0" cy="0"/>
+        </a:xfrm>
+      </p:grpSpPr>
+      <p:sp>
+        <p:nvSpPr>
+          <p:cNvPr id="2" name="Title 1"/>
+          <p:cNvSpPr>
+            <a:spLocks noGrp="1"/>
+          </p:cNvSpPr>
+          <p:nvPr>
+            <p:ph type="title"/>
+          </p:nvPr>
+        </p:nvSpPr>
+        <p:spPr/>
+        <p:txBody>
+          <a:bodyPr/>
+          <a:lstStyle/>
+          <a:p>
+            <a:pPr lvl="0" marL="0" indent="0">
+              <a:buNone/>
+            </a:pPr>
+            <a:r>
+              <a:rPr/>
+              <a:t>In</a:t>
+            </a:r>
+            <a:r>
+              <a:rPr/>
+              <a:t> </a:t>
+            </a:r>
+            <a:r>
+              <a:rPr/>
+              <a:t>Conclusion</a:t>
+            </a:r>
+          </a:p>
+        </p:txBody>
+      </p:sp>
+      <p:sp>
+        <p:nvSpPr>
+          <p:cNvPr id="3" name="Content Placeholder 2"/>
+          <p:cNvSpPr>
+            <a:spLocks noGrp="1"/>
+          </p:cNvSpPr>
+          <p:nvPr>
+            <p:ph idx="1"/>
+          </p:nvPr>
+        </p:nvSpPr>
+        <p:spPr/>
+        <p:txBody>
+          <a:bodyPr/>
+          <a:lstStyle/>
+          <a:p>
+            <a:pPr lvl="1"/>
+            <a:r>
+              <a:rPr/>
+              <a:t>Games with an ESRB rating of “Mature” sell more games on average</a:t>
+            </a:r>
+          </a:p>
+          <a:p>
+            <a:pPr lvl="1"/>
+            <a:r>
+              <a:rPr/>
+              <a:t>Games released on XBox and PlayStation sell well in Europe and North America </a:t>
+            </a:r>
+          </a:p>
+          <a:p>
+            <a:pPr lvl="1"/>
+            <a:r>
+              <a:rPr/>
+              <a:t>Games in the Shooter, Platform and Action/Action-Adventure genres sell well.</a:t>
+            </a:r>
+          </a:p>
+        </p:txBody>
+      </p:sp>
+    </p:spTree>
+  </p:cSld>
+</p:sld>
+</file>
+
+<file path=ppt/slides/slide12.xml><?xml version="1.0" encoding="utf-8"?>
+<p:sld xmlns:a="http://schemas.openxmlformats.org/drawingml/2006/main" xmlns:r="http://schemas.openxmlformats.org/officeDocument/2006/relationships" xmlns:p="http://schemas.openxmlformats.org/presentationml/2006/main">
+  <p:cSld>
+    <p:spTree>
+      <p:nvGrpSpPr>
+        <p:cNvPr id="1" name=""/>
+        <p:cNvGrpSpPr/>
+        <p:nvPr/>
+      </p:nvGrpSpPr>
+      <p:grpSpPr>
+        <a:xfrm>
+          <a:off x="0" y="0"/>
+          <a:ext cx="0" cy="0"/>
+          <a:chOff x="0" y="0"/>
+          <a:chExt cx="0" cy="0"/>
+        </a:xfrm>
+      </p:grpSpPr>
+      <p:sp>
+        <p:nvSpPr>
+          <p:cNvPr id="2" name="Title 1"/>
+          <p:cNvSpPr>
+            <a:spLocks noGrp="1"/>
+          </p:cNvSpPr>
+          <p:nvPr>
+            <p:ph type="title"/>
+          </p:nvPr>
+        </p:nvSpPr>
+        <p:spPr/>
+        <p:txBody>
+          <a:bodyPr/>
+          <a:lstStyle/>
+          <a:p>
+            <a:pPr lvl="0" marL="0" indent="0">
+              <a:buNone/>
+            </a:pPr>
+            <a:r>
+              <a:rPr/>
+              <a:t>Any</a:t>
+            </a:r>
+            <a:r>
+              <a:rPr/>
+              <a:t> </a:t>
+            </a:r>
+            <a:r>
+              <a:rPr/>
+              <a:t>Questions?</a:t>
+            </a:r>
+          </a:p>
+        </p:txBody>
+      </p:sp>
+    </p:spTree>
+  </p:cSld>
+</p:sld>
+</file>
+
 <file path=ppt/slides/slide2.xml><?xml version="1.0" encoding="utf-8"?>
 <p:sld xmlns:a="http://schemas.openxmlformats.org/drawingml/2006/main" xmlns:r="http://schemas.openxmlformats.org/officeDocument/2006/relationships" xmlns:p="http://schemas.openxmlformats.org/presentationml/2006/main">
   <p:cSld>
@@ -3599,7 +3862,7 @@
                       </a:pPr>
                       <a:r>
                         <a:rPr/>
-                        <a:t>Mean</a:t>
+                        <a:t>Median</a:t>
                       </a:r>
                       <a:r>
                         <a:rPr/>
@@ -3680,7 +3943,7 @@
                       </a:pPr>
                       <a:r>
                         <a:rPr/>
-                        <a:t>0.0900000</a:t>
+                        <a:t>0.090</a:t>
                       </a:r>
                     </a:p>
                   </a:txBody>
@@ -3727,7 +3990,7 @@
                       </a:pPr>
                       <a:r>
                         <a:rPr/>
-                        <a:t>1.8900000</a:t>
+                        <a:t>1.890</a:t>
                       </a:r>
                     </a:p>
                   </a:txBody>
@@ -3782,7 +4045,7 @@
                       </a:pPr>
                       <a:r>
                         <a:rPr/>
-                        <a:t>0.1550000</a:t>
+                        <a:t>0.155</a:t>
                       </a:r>
                     </a:p>
                   </a:txBody>
@@ -3829,7 +4092,7 @@
                       </a:pPr>
                       <a:r>
                         <a:rPr/>
-                        <a:t>0.3706250</a:t>
+                        <a:t>0.150</a:t>
                       </a:r>
                     </a:p>
                   </a:txBody>
@@ -3876,7 +4139,7 @@
                       </a:pPr>
                       <a:r>
                         <a:rPr/>
-                        <a:t>0.2073077</a:t>
+                        <a:t>0.135</a:t>
                       </a:r>
                     </a:p>
                   </a:txBody>
@@ -3923,7 +4186,7 @@
                       </a:pPr>
                       <a:r>
                         <a:rPr/>
-                        <a:t>0.3693007</a:t>
+                        <a:t>0.170</a:t>
                       </a:r>
                     </a:p>
                   </a:txBody>
@@ -3978,7 +4241,7 @@
                       </a:pPr>
                       <a:r>
                         <a:rPr/>
-                        <a:t>0.0304386</a:t>
+                        <a:t>0.020</a:t>
                       </a:r>
                     </a:p>
                   </a:txBody>
@@ -4025,7 +4288,7 @@
                       </a:pPr>
                       <a:r>
                         <a:rPr/>
-                        <a:t>0.6048638</a:t>
+                        <a:t>0.230</a:t>
                       </a:r>
                     </a:p>
                   </a:txBody>
@@ -4057,7 +4320,7 @@
                       </a:pPr>
                       <a:r>
                         <a:rPr/>
-                        <a:t>Puzzle</a:t>
+                        <a:t>Fighting</a:t>
                       </a:r>
                     </a:p>
                   </a:txBody>
@@ -4072,7 +4335,7 @@
                       </a:pPr>
                       <a:r>
                         <a:rPr/>
-                        <a:t>0.1854916</a:t>
+                        <a:t>0.150</a:t>
                       </a:r>
                     </a:p>
                   </a:txBody>
@@ -4087,7 +4350,7 @@
                       </a:pPr>
                       <a:r>
                         <a:rPr/>
-                        <a:t>589</a:t>
+                        <a:t>492</a:t>
                       </a:r>
                     </a:p>
                   </a:txBody>
@@ -4119,7 +4382,7 @@
                       </a:pPr>
                       <a:r>
                         <a:rPr/>
-                        <a:t>0.4387177</a:t>
+                        <a:t>0.160</a:t>
                       </a:r>
                     </a:p>
                   </a:txBody>
@@ -4134,7 +4397,7 @@
                       </a:pPr>
                       <a:r>
                         <a:rPr/>
-                        <a:t>614</a:t>
+                        <a:t>508</a:t>
                       </a:r>
                     </a:p>
                   </a:txBody>
@@ -4151,7 +4414,7 @@
                       </a:pPr>
                       <a:r>
                         <a:rPr/>
-                        <a:t>Fighting</a:t>
+                        <a:t>Puzzle</a:t>
                       </a:r>
                     </a:p>
                   </a:txBody>
@@ -4166,7 +4429,7 @@
                       </a:pPr>
                       <a:r>
                         <a:rPr/>
-                        <a:t>0.4085360</a:t>
+                        <a:t>0.050</a:t>
                       </a:r>
                     </a:p>
                   </a:txBody>
@@ -4181,7 +4444,7 @@
                       </a:pPr>
                       <a:r>
                         <a:rPr/>
-                        <a:t>641</a:t>
+                        <a:t>523</a:t>
                       </a:r>
                     </a:p>
                   </a:txBody>
@@ -4213,7 +4476,7 @@
                       </a:pPr>
                       <a:r>
                         <a:rPr/>
-                        <a:t>0.1680186</a:t>
+                        <a:t>0.040</a:t>
                       </a:r>
                     </a:p>
                   </a:txBody>
@@ -4228,7 +4491,7 @@
                       </a:pPr>
                       <a:r>
                         <a:rPr/>
-                        <a:t>733</a:t>
+                        <a:t>626</a:t>
                       </a:r>
                     </a:p>
                   </a:txBody>
@@ -4280,7 +4543,7 @@
             </a:pPr>
             <a:r>
               <a:rPr/>
-              <a:t>Slide</a:t>
+              <a:t>Corrected</a:t>
             </a:r>
             <a:r>
               <a:rPr/>
@@ -4288,7 +4551,7 @@
             </a:r>
             <a:r>
               <a:rPr/>
-              <a:t>with</a:t>
+              <a:t>to</a:t>
             </a:r>
             <a:r>
               <a:rPr/>
@@ -4296,14 +4559,466 @@
             </a:r>
             <a:r>
               <a:rPr/>
-              <a:t>Plot</a:t>
+              <a:t>Compensate</a:t>
+            </a:r>
+            <a:r>
+              <a:rPr/>
+              <a:t> </a:t>
+            </a:r>
+            <a:r>
+              <a:rPr/>
+              <a:t>for</a:t>
+            </a:r>
+            <a:r>
+              <a:rPr/>
+              <a:t> </a:t>
+            </a:r>
+            <a:r>
+              <a:rPr/>
+              <a:t>Minecraft</a:t>
             </a:r>
           </a:p>
         </p:txBody>
       </p:sp>
       <p:pic>
         <p:nvPicPr>
-          <p:cNvPr descr="video_games_presentation_files/figure-pptx/pressure-1.png" id="0" name="Picture 1"/>
+          <p:cNvPr descr="video_games_presentation_files/figure-pptx/unnamed-chunk-4-1.png" id="0" name="Picture 1"/>
+          <p:cNvPicPr>
+            <a:picLocks noGrp="1" noChangeAspect="1"/>
+          </p:cNvPicPr>
+          <p:nvPr/>
+        </p:nvPicPr>
+        <p:blipFill>
+          <a:blip r:embed="rId2"/>
+          <a:stretch>
+            <a:fillRect/>
+          </a:stretch>
+        </p:blipFill>
+        <p:spPr bwMode="auto">
+          <a:xfrm>
+            <a:off x="1562100" y="1600200"/>
+            <a:ext cx="6032500" cy="4521200"/>
+          </a:xfrm>
+          <a:prstGeom prst="rect">
+            <a:avLst/>
+          </a:prstGeom>
+          <a:noFill/>
+          <a:ln w="9525">
+            <a:noFill/>
+            <a:headEnd/>
+            <a:tailEnd/>
+          </a:ln>
+        </p:spPr>
+      </p:pic>
+    </p:spTree>
+  </p:cSld>
+</p:sld>
+</file>
+
+<file path=ppt/slides/slide6.xml><?xml version="1.0" encoding="utf-8"?>
+<p:sld xmlns:a="http://schemas.openxmlformats.org/drawingml/2006/main" xmlns:r="http://schemas.openxmlformats.org/officeDocument/2006/relationships" xmlns:p="http://schemas.openxmlformats.org/presentationml/2006/main">
+  <p:cSld>
+    <p:spTree>
+      <p:nvGrpSpPr>
+        <p:cNvPr id="1" name=""/>
+        <p:cNvGrpSpPr/>
+        <p:nvPr/>
+      </p:nvGrpSpPr>
+      <p:grpSpPr>
+        <a:xfrm>
+          <a:off x="0" y="0"/>
+          <a:ext cx="0" cy="0"/>
+          <a:chOff x="0" y="0"/>
+          <a:chExt cx="0" cy="0"/>
+        </a:xfrm>
+      </p:grpSpPr>
+      <p:sp>
+        <p:nvSpPr>
+          <p:cNvPr id="2" name="Title 1"/>
+          <p:cNvSpPr>
+            <a:spLocks noGrp="1"/>
+          </p:cNvSpPr>
+          <p:nvPr>
+            <p:ph type="title"/>
+          </p:nvPr>
+        </p:nvSpPr>
+        <p:spPr/>
+        <p:txBody>
+          <a:bodyPr/>
+          <a:lstStyle/>
+          <a:p>
+            <a:pPr lvl="0" marL="0" indent="0">
+              <a:buNone/>
+            </a:pPr>
+            <a:r>
+              <a:rPr/>
+              <a:t>What</a:t>
+            </a:r>
+            <a:r>
+              <a:rPr/>
+              <a:t> </a:t>
+            </a:r>
+            <a:r>
+              <a:rPr/>
+              <a:t>About</a:t>
+            </a:r>
+            <a:r>
+              <a:rPr/>
+              <a:t> </a:t>
+            </a:r>
+            <a:r>
+              <a:rPr/>
+              <a:t>Seperate</a:t>
+            </a:r>
+            <a:r>
+              <a:rPr/>
+              <a:t> </a:t>
+            </a:r>
+            <a:r>
+              <a:rPr/>
+              <a:t>Markets?</a:t>
+            </a:r>
+          </a:p>
+        </p:txBody>
+      </p:sp>
+      <p:pic>
+        <p:nvPicPr>
+          <p:cNvPr descr="video_games_presentation_files/figure-pptx/unnamed-chunk-5-1.png" id="0" name="Picture 1"/>
+          <p:cNvPicPr>
+            <a:picLocks noGrp="1" noChangeAspect="1"/>
+          </p:cNvPicPr>
+          <p:nvPr/>
+        </p:nvPicPr>
+        <p:blipFill>
+          <a:blip r:embed="rId2"/>
+          <a:stretch>
+            <a:fillRect/>
+          </a:stretch>
+        </p:blipFill>
+        <p:spPr bwMode="auto">
+          <a:xfrm>
+            <a:off x="1562100" y="1600200"/>
+            <a:ext cx="6032500" cy="4521200"/>
+          </a:xfrm>
+          <a:prstGeom prst="rect">
+            <a:avLst/>
+          </a:prstGeom>
+          <a:noFill/>
+          <a:ln w="9525">
+            <a:noFill/>
+            <a:headEnd/>
+            <a:tailEnd/>
+          </a:ln>
+        </p:spPr>
+      </p:pic>
+    </p:spTree>
+  </p:cSld>
+</p:sld>
+</file>
+
+<file path=ppt/slides/slide7.xml><?xml version="1.0" encoding="utf-8"?>
+<p:sld xmlns:a="http://schemas.openxmlformats.org/drawingml/2006/main" xmlns:r="http://schemas.openxmlformats.org/officeDocument/2006/relationships" xmlns:p="http://schemas.openxmlformats.org/presentationml/2006/main">
+  <p:cSld>
+    <p:spTree>
+      <p:nvGrpSpPr>
+        <p:cNvPr id="1" name=""/>
+        <p:cNvGrpSpPr/>
+        <p:nvPr/>
+      </p:nvGrpSpPr>
+      <p:grpSpPr>
+        <a:xfrm>
+          <a:off x="0" y="0"/>
+          <a:ext cx="0" cy="0"/>
+          <a:chOff x="0" y="0"/>
+          <a:chExt cx="0" cy="0"/>
+        </a:xfrm>
+      </p:grpSpPr>
+      <p:sp>
+        <p:nvSpPr>
+          <p:cNvPr id="2" name="Title 1"/>
+          <p:cNvSpPr>
+            <a:spLocks noGrp="1"/>
+          </p:cNvSpPr>
+          <p:nvPr>
+            <p:ph type="title"/>
+          </p:nvPr>
+        </p:nvSpPr>
+        <p:spPr/>
+        <p:txBody>
+          <a:bodyPr/>
+          <a:lstStyle/>
+          <a:p>
+            <a:pPr lvl="0" marL="0" indent="0">
+              <a:buNone/>
+            </a:pPr>
+            <a:r>
+              <a:rPr/>
+              <a:t>The</a:t>
+            </a:r>
+            <a:r>
+              <a:rPr/>
+              <a:t> </a:t>
+            </a:r>
+            <a:r>
+              <a:rPr/>
+              <a:t>Global</a:t>
+            </a:r>
+            <a:r>
+              <a:rPr/>
+              <a:t> </a:t>
+            </a:r>
+            <a:r>
+              <a:rPr/>
+              <a:t>Markets</a:t>
+            </a:r>
+          </a:p>
+        </p:txBody>
+      </p:sp>
+      <p:pic>
+        <p:nvPicPr>
+          <p:cNvPr descr="video_games_presentation_files/figure-pptx/unnamed-chunk-6-1.png" id="0" name="Picture 1"/>
+          <p:cNvPicPr>
+            <a:picLocks noGrp="1" noChangeAspect="1"/>
+          </p:cNvPicPr>
+          <p:nvPr/>
+        </p:nvPicPr>
+        <p:blipFill>
+          <a:blip r:embed="rId2"/>
+          <a:stretch>
+            <a:fillRect/>
+          </a:stretch>
+        </p:blipFill>
+        <p:spPr bwMode="auto">
+          <a:xfrm>
+            <a:off x="1752600" y="1600200"/>
+            <a:ext cx="5651500" cy="4521200"/>
+          </a:xfrm>
+          <a:prstGeom prst="rect">
+            <a:avLst/>
+          </a:prstGeom>
+          <a:noFill/>
+          <a:ln w="9525">
+            <a:noFill/>
+            <a:headEnd/>
+            <a:tailEnd/>
+          </a:ln>
+        </p:spPr>
+      </p:pic>
+    </p:spTree>
+  </p:cSld>
+</p:sld>
+</file>
+
+<file path=ppt/slides/slide8.xml><?xml version="1.0" encoding="utf-8"?>
+<p:sld xmlns:a="http://schemas.openxmlformats.org/drawingml/2006/main" xmlns:r="http://schemas.openxmlformats.org/officeDocument/2006/relationships" xmlns:p="http://schemas.openxmlformats.org/presentationml/2006/main">
+  <p:cSld>
+    <p:spTree>
+      <p:nvGrpSpPr>
+        <p:cNvPr id="1" name=""/>
+        <p:cNvGrpSpPr/>
+        <p:nvPr/>
+      </p:nvGrpSpPr>
+      <p:grpSpPr>
+        <a:xfrm>
+          <a:off x="0" y="0"/>
+          <a:ext cx="0" cy="0"/>
+          <a:chOff x="0" y="0"/>
+          <a:chExt cx="0" cy="0"/>
+        </a:xfrm>
+      </p:grpSpPr>
+      <p:sp>
+        <p:nvSpPr>
+          <p:cNvPr id="2" name="Title 1"/>
+          <p:cNvSpPr>
+            <a:spLocks noGrp="1"/>
+          </p:cNvSpPr>
+          <p:nvPr>
+            <p:ph type="title"/>
+          </p:nvPr>
+        </p:nvSpPr>
+        <p:spPr/>
+        <p:txBody>
+          <a:bodyPr/>
+          <a:lstStyle/>
+          <a:p>
+            <a:pPr lvl="0" marL="0" indent="0">
+              <a:buNone/>
+            </a:pPr>
+            <a:r>
+              <a:rPr/>
+              <a:t>How</a:t>
+            </a:r>
+            <a:r>
+              <a:rPr/>
+              <a:t> </a:t>
+            </a:r>
+            <a:r>
+              <a:rPr/>
+              <a:t>do</a:t>
+            </a:r>
+            <a:r>
+              <a:rPr/>
+              <a:t> </a:t>
+            </a:r>
+            <a:r>
+              <a:rPr/>
+              <a:t>Sales</a:t>
+            </a:r>
+            <a:r>
+              <a:rPr/>
+              <a:t> </a:t>
+            </a:r>
+            <a:r>
+              <a:rPr/>
+              <a:t>Compare</a:t>
+            </a:r>
+            <a:r>
+              <a:rPr/>
+              <a:t> </a:t>
+            </a:r>
+            <a:r>
+              <a:rPr/>
+              <a:t>With</a:t>
+            </a:r>
+            <a:r>
+              <a:rPr/>
+              <a:t> </a:t>
+            </a:r>
+            <a:r>
+              <a:rPr/>
+              <a:t>Rating?</a:t>
+            </a:r>
+          </a:p>
+        </p:txBody>
+      </p:sp>
+      <p:pic>
+        <p:nvPicPr>
+          <p:cNvPr descr="video_games_presentation_files/figure-pptx/unnamed-chunk-7-1.png" id="0" name="Picture 1"/>
+          <p:cNvPicPr>
+            <a:picLocks noGrp="1" noChangeAspect="1"/>
+          </p:cNvPicPr>
+          <p:nvPr/>
+        </p:nvPicPr>
+        <p:blipFill>
+          <a:blip r:embed="rId2"/>
+          <a:stretch>
+            <a:fillRect/>
+          </a:stretch>
+        </p:blipFill>
+        <p:spPr bwMode="auto">
+          <a:xfrm>
+            <a:off x="1752600" y="1600200"/>
+            <a:ext cx="5651500" cy="4521200"/>
+          </a:xfrm>
+          <a:prstGeom prst="rect">
+            <a:avLst/>
+          </a:prstGeom>
+          <a:noFill/>
+          <a:ln w="9525">
+            <a:noFill/>
+            <a:headEnd/>
+            <a:tailEnd/>
+          </a:ln>
+        </p:spPr>
+      </p:pic>
+    </p:spTree>
+  </p:cSld>
+</p:sld>
+</file>
+
+<file path=ppt/slides/slide9.xml><?xml version="1.0" encoding="utf-8"?>
+<p:sld xmlns:a="http://schemas.openxmlformats.org/drawingml/2006/main" xmlns:r="http://schemas.openxmlformats.org/officeDocument/2006/relationships" xmlns:p="http://schemas.openxmlformats.org/presentationml/2006/main">
+  <p:cSld>
+    <p:spTree>
+      <p:nvGrpSpPr>
+        <p:cNvPr id="1" name=""/>
+        <p:cNvGrpSpPr/>
+        <p:nvPr/>
+      </p:nvGrpSpPr>
+      <p:grpSpPr>
+        <a:xfrm>
+          <a:off x="0" y="0"/>
+          <a:ext cx="0" cy="0"/>
+          <a:chOff x="0" y="0"/>
+          <a:chExt cx="0" cy="0"/>
+        </a:xfrm>
+      </p:grpSpPr>
+      <p:sp>
+        <p:nvSpPr>
+          <p:cNvPr id="2" name="Title 1"/>
+          <p:cNvSpPr>
+            <a:spLocks noGrp="1"/>
+          </p:cNvSpPr>
+          <p:nvPr>
+            <p:ph type="title"/>
+          </p:nvPr>
+        </p:nvSpPr>
+        <p:spPr/>
+        <p:txBody>
+          <a:bodyPr/>
+          <a:lstStyle/>
+          <a:p>
+            <a:pPr lvl="0" marL="0" indent="0">
+              <a:buNone/>
+            </a:pPr>
+            <a:r>
+              <a:rPr/>
+              <a:t>How</a:t>
+            </a:r>
+            <a:r>
+              <a:rPr/>
+              <a:t> </a:t>
+            </a:r>
+            <a:r>
+              <a:rPr/>
+              <a:t>Do</a:t>
+            </a:r>
+            <a:r>
+              <a:rPr/>
+              <a:t> </a:t>
+            </a:r>
+            <a:r>
+              <a:rPr/>
+              <a:t>Sales</a:t>
+            </a:r>
+            <a:r>
+              <a:rPr/>
+              <a:t> </a:t>
+            </a:r>
+            <a:r>
+              <a:rPr/>
+              <a:t>Differ</a:t>
+            </a:r>
+            <a:r>
+              <a:rPr/>
+              <a:t> </a:t>
+            </a:r>
+            <a:r>
+              <a:rPr/>
+              <a:t>for</a:t>
+            </a:r>
+            <a:r>
+              <a:rPr/>
+              <a:t> </a:t>
+            </a:r>
+            <a:r>
+              <a:rPr/>
+              <a:t>Different</a:t>
+            </a:r>
+            <a:r>
+              <a:rPr/>
+              <a:t> </a:t>
+            </a:r>
+            <a:r>
+              <a:rPr/>
+              <a:t>Platforms?</a:t>
+            </a:r>
+          </a:p>
+        </p:txBody>
+      </p:sp>
+      <p:pic>
+        <p:nvPicPr>
+          <p:cNvPr descr="video_games_presentation_files/figure-pptx/unnamed-chunk-8-1.png" id="0" name="Picture 1"/>
           <p:cNvPicPr>
             <a:picLocks noGrp="1" noChangeAspect="1"/>
           </p:cNvPicPr>

</xml_diff>